<commit_message>
Update BDD vs Evil Programmer.pptx
</commit_message>
<xml_diff>
--- a/BDD vs Evil Programmer.pptx
+++ b/BDD vs Evil Programmer.pptx
@@ -19,7 +19,7 @@
     <p:sldId id="273" r:id="rId10"/>
     <p:sldId id="403" r:id="rId11"/>
     <p:sldId id="411" r:id="rId12"/>
-    <p:sldId id="326" r:id="rId13"/>
+    <p:sldId id="413" r:id="rId13"/>
     <p:sldId id="285" r:id="rId14"/>
   </p:sldIdLst>
   <p:sldSz cx="9144000" cy="5143500" type="screen16x9"/>
@@ -6726,10 +6726,133 @@
           <a:chExt cx="0" cy="0"/>
         </a:xfrm>
       </p:grpSpPr>
+      <p:pic>
+        <p:nvPicPr>
+          <p:cNvPr id="3" name="Graphic 2">
+            <a:extLst>
+              <a:ext uri="{FF2B5EF4-FFF2-40B4-BE49-F238E27FC236}">
+                <a16:creationId xmlns:a16="http://schemas.microsoft.com/office/drawing/2014/main" id="{11298FB5-F327-BEF2-BF1D-DCA283336CEC}"/>
+              </a:ext>
+            </a:extLst>
+          </p:cNvPr>
+          <p:cNvPicPr>
+            <a:picLocks noChangeAspect="1"/>
+          </p:cNvPicPr>
+          <p:nvPr/>
+        </p:nvPicPr>
+        <p:blipFill>
+          <a:blip r:embed="rId2">
+            <a:extLst>
+              <a:ext uri="{28A0092B-C50C-407E-A947-70E740481C1C}">
+                <a14:useLocalDpi xmlns:a14="http://schemas.microsoft.com/office/drawing/2010/main" val="0"/>
+              </a:ext>
+              <a:ext uri="{96DAC541-7B7A-43D3-8B79-37D633B846F1}">
+                <asvg:svgBlip xmlns:asvg="http://schemas.microsoft.com/office/drawing/2016/SVG/main" r:embed="rId3"/>
+              </a:ext>
+            </a:extLst>
+          </a:blip>
+          <a:stretch>
+            <a:fillRect/>
+          </a:stretch>
+        </p:blipFill>
+        <p:spPr>
+          <a:xfrm>
+            <a:off x="0" y="0"/>
+            <a:ext cx="5143500" cy="5143500"/>
+          </a:xfrm>
+          <a:prstGeom prst="rect">
+            <a:avLst/>
+          </a:prstGeom>
+        </p:spPr>
+      </p:pic>
+      <p:sp>
+        <p:nvSpPr>
+          <p:cNvPr id="5" name="TextBox 4">
+            <a:extLst>
+              <a:ext uri="{FF2B5EF4-FFF2-40B4-BE49-F238E27FC236}">
+                <a16:creationId xmlns:a16="http://schemas.microsoft.com/office/drawing/2014/main" id="{B8394CA6-B93B-9D8B-DAE0-B68EF788A820}"/>
+              </a:ext>
+            </a:extLst>
+          </p:cNvPr>
+          <p:cNvSpPr txBox="1"/>
+          <p:nvPr/>
+        </p:nvSpPr>
+        <p:spPr>
+          <a:xfrm>
+            <a:off x="5181600" y="4476750"/>
+            <a:ext cx="4048208" cy="246221"/>
+          </a:xfrm>
+          <a:prstGeom prst="rect">
+            <a:avLst/>
+          </a:prstGeom>
+          <a:noFill/>
+        </p:spPr>
+        <p:txBody>
+          <a:bodyPr wrap="square">
+            <a:spAutoFit/>
+          </a:bodyPr>
+          <a:lstStyle/>
+          <a:p>
+            <a:r>
+              <a:rPr lang="en-US" sz="1000" dirty="0">
+                <a:solidFill>
+                  <a:schemeClr val="bg1"/>
+                </a:solidFill>
+              </a:rPr>
+              <a:t>https://</a:t>
+            </a:r>
+            <a:r>
+              <a:rPr lang="en-US" sz="1000" dirty="0" err="1">
+                <a:solidFill>
+                  <a:schemeClr val="bg1"/>
+                </a:solidFill>
+              </a:rPr>
+              <a:t>github.com</a:t>
+            </a:r>
+            <a:r>
+              <a:rPr lang="en-US" sz="1000" dirty="0">
+                <a:solidFill>
+                  <a:schemeClr val="bg1"/>
+                </a:solidFill>
+              </a:rPr>
+              <a:t>/</a:t>
+            </a:r>
+            <a:r>
+              <a:rPr lang="en-US" sz="1000" dirty="0" err="1">
+                <a:solidFill>
+                  <a:schemeClr val="bg1"/>
+                </a:solidFill>
+              </a:rPr>
+              <a:t>isidore</a:t>
+            </a:r>
+            <a:r>
+              <a:rPr lang="en-US" sz="1000" dirty="0">
+                <a:solidFill>
+                  <a:schemeClr val="bg1"/>
+                </a:solidFill>
+              </a:rPr>
+              <a:t>/Talks/blob/master/</a:t>
+            </a:r>
+            <a:r>
+              <a:rPr lang="en-US" sz="1000" dirty="0" err="1">
+                <a:solidFill>
+                  <a:schemeClr val="bg1"/>
+                </a:solidFill>
+              </a:rPr>
+              <a:t>BDDvsEvilProgrammer.md</a:t>
+            </a:r>
+            <a:endParaRPr lang="en-US" sz="1000" dirty="0">
+              <a:solidFill>
+                <a:schemeClr val="bg1"/>
+              </a:solidFill>
+            </a:endParaRPr>
+          </a:p>
+        </p:txBody>
+      </p:sp>
     </p:spTree>
     <p:extLst>
       <p:ext uri="{BB962C8B-B14F-4D97-AF65-F5344CB8AC3E}">
-        <p14:creationId xmlns:p14="http://schemas.microsoft.com/office/powerpoint/2010/main" val="118217575"/>
+        <p14:creationId xmlns:p14="http://schemas.microsoft.com/office/powerpoint/2010/main" val="1899570959"/>
       </p:ext>
     </p:extLst>
   </p:cSld>
@@ -6897,14 +7020,14 @@
           </a:effectLst>
           <a:extLst>
             <a:ext uri="{909E8E84-426E-40dd-AFC4-6F175D3DCCD1}">
-              <a14:hiddenFill xmlns:a14="http://schemas.microsoft.com/office/drawing/2010/main" xmlns="">
+              <a14:hiddenFill xmlns="" xmlns:a14="http://schemas.microsoft.com/office/drawing/2010/main">
                 <a:solidFill>
                   <a:schemeClr val="accent1"/>
                 </a:solidFill>
               </a14:hiddenFill>
             </a:ext>
             <a:ext uri="{91240B29-F687-4f45-9708-019B960494DF}">
-              <a14:hiddenLine xmlns:a14="http://schemas.microsoft.com/office/drawing/2010/main" xmlns="" w="9525">
+              <a14:hiddenLine xmlns="" xmlns:a14="http://schemas.microsoft.com/office/drawing/2010/main" w="9525">
                 <a:solidFill>
                   <a:schemeClr val="tx1"/>
                 </a:solidFill>
@@ -7219,6 +7342,129 @@
           <a:chExt cx="0" cy="0"/>
         </a:xfrm>
       </p:grpSpPr>
+      <p:pic>
+        <p:nvPicPr>
+          <p:cNvPr id="3" name="Graphic 2">
+            <a:extLst>
+              <a:ext uri="{FF2B5EF4-FFF2-40B4-BE49-F238E27FC236}">
+                <a16:creationId xmlns:a16="http://schemas.microsoft.com/office/drawing/2014/main" id="{11298FB5-F327-BEF2-BF1D-DCA283336CEC}"/>
+              </a:ext>
+            </a:extLst>
+          </p:cNvPr>
+          <p:cNvPicPr>
+            <a:picLocks noChangeAspect="1"/>
+          </p:cNvPicPr>
+          <p:nvPr/>
+        </p:nvPicPr>
+        <p:blipFill>
+          <a:blip r:embed="rId2">
+            <a:extLst>
+              <a:ext uri="{28A0092B-C50C-407E-A947-70E740481C1C}">
+                <a14:useLocalDpi xmlns:a14="http://schemas.microsoft.com/office/drawing/2010/main" val="0"/>
+              </a:ext>
+              <a:ext uri="{96DAC541-7B7A-43D3-8B79-37D633B846F1}">
+                <asvg:svgBlip xmlns:asvg="http://schemas.microsoft.com/office/drawing/2016/SVG/main" r:embed="rId3"/>
+              </a:ext>
+            </a:extLst>
+          </a:blip>
+          <a:stretch>
+            <a:fillRect/>
+          </a:stretch>
+        </p:blipFill>
+        <p:spPr>
+          <a:xfrm>
+            <a:off x="0" y="0"/>
+            <a:ext cx="5143500" cy="5143500"/>
+          </a:xfrm>
+          <a:prstGeom prst="rect">
+            <a:avLst/>
+          </a:prstGeom>
+        </p:spPr>
+      </p:pic>
+      <p:sp>
+        <p:nvSpPr>
+          <p:cNvPr id="5" name="TextBox 4">
+            <a:extLst>
+              <a:ext uri="{FF2B5EF4-FFF2-40B4-BE49-F238E27FC236}">
+                <a16:creationId xmlns:a16="http://schemas.microsoft.com/office/drawing/2014/main" id="{B8394CA6-B93B-9D8B-DAE0-B68EF788A820}"/>
+              </a:ext>
+            </a:extLst>
+          </p:cNvPr>
+          <p:cNvSpPr txBox="1"/>
+          <p:nvPr/>
+        </p:nvSpPr>
+        <p:spPr>
+          <a:xfrm>
+            <a:off x="5181600" y="4476750"/>
+            <a:ext cx="4048208" cy="246221"/>
+          </a:xfrm>
+          <a:prstGeom prst="rect">
+            <a:avLst/>
+          </a:prstGeom>
+          <a:noFill/>
+        </p:spPr>
+        <p:txBody>
+          <a:bodyPr wrap="square">
+            <a:spAutoFit/>
+          </a:bodyPr>
+          <a:lstStyle/>
+          <a:p>
+            <a:r>
+              <a:rPr lang="en-US" sz="1000" dirty="0">
+                <a:solidFill>
+                  <a:schemeClr val="bg1"/>
+                </a:solidFill>
+              </a:rPr>
+              <a:t>https://</a:t>
+            </a:r>
+            <a:r>
+              <a:rPr lang="en-US" sz="1000" dirty="0" err="1">
+                <a:solidFill>
+                  <a:schemeClr val="bg1"/>
+                </a:solidFill>
+              </a:rPr>
+              <a:t>github.com</a:t>
+            </a:r>
+            <a:r>
+              <a:rPr lang="en-US" sz="1000" dirty="0">
+                <a:solidFill>
+                  <a:schemeClr val="bg1"/>
+                </a:solidFill>
+              </a:rPr>
+              <a:t>/</a:t>
+            </a:r>
+            <a:r>
+              <a:rPr lang="en-US" sz="1000" dirty="0" err="1">
+                <a:solidFill>
+                  <a:schemeClr val="bg1"/>
+                </a:solidFill>
+              </a:rPr>
+              <a:t>isidore</a:t>
+            </a:r>
+            <a:r>
+              <a:rPr lang="en-US" sz="1000" dirty="0">
+                <a:solidFill>
+                  <a:schemeClr val="bg1"/>
+                </a:solidFill>
+              </a:rPr>
+              <a:t>/Talks/blob/master/</a:t>
+            </a:r>
+            <a:r>
+              <a:rPr lang="en-US" sz="1000" dirty="0" err="1">
+                <a:solidFill>
+                  <a:schemeClr val="bg1"/>
+                </a:solidFill>
+              </a:rPr>
+              <a:t>BDDvsEvilProgrammer.md</a:t>
+            </a:r>
+            <a:endParaRPr lang="en-US" sz="1000" dirty="0">
+              <a:solidFill>
+                <a:schemeClr val="bg1"/>
+              </a:solidFill>
+            </a:endParaRPr>
+          </a:p>
+        </p:txBody>
+      </p:sp>
     </p:spTree>
     <p:extLst>
       <p:ext uri="{BB962C8B-B14F-4D97-AF65-F5344CB8AC3E}">

</xml_diff>